<commit_message>
fix slide so that the green text matches. #34
</commit_message>
<xml_diff>
--- a/public/js/tasks/blind_dating/media/Blind_dating_game_instructionsV2.pptx
+++ b/public/js/tasks/blind_dating/media/Blind_dating_game_instructionsV2.pptx
@@ -263,7 +263,7 @@
           <a:p>
             <a:fld id="{5ACDFB13-8C7E-2148-B293-047F9641DD71}" type="datetimeFigureOut">
               <a:rPr lang="en-US" smtClean="0"/>
-              <a:t>8/5/22</a:t>
+              <a:t>8/15/22</a:t>
             </a:fld>
             <a:endParaRPr lang="en-US" dirty="0"/>
           </a:p>
@@ -3479,7 +3479,7 @@
           <a:p>
             <a:fld id="{E69A4D3A-6EF8-7448-AC6F-AD52FEDAA6A8}" type="datetimeFigureOut">
               <a:rPr lang="en-US" smtClean="0"/>
-              <a:t>8/5/22</a:t>
+              <a:t>8/15/22</a:t>
             </a:fld>
             <a:endParaRPr lang="en-US" dirty="0"/>
           </a:p>
@@ -3647,7 +3647,7 @@
           <a:p>
             <a:fld id="{E69A4D3A-6EF8-7448-AC6F-AD52FEDAA6A8}" type="datetimeFigureOut">
               <a:rPr lang="en-US" smtClean="0"/>
-              <a:t>8/5/22</a:t>
+              <a:t>8/15/22</a:t>
             </a:fld>
             <a:endParaRPr lang="en-US" dirty="0"/>
           </a:p>
@@ -3825,7 +3825,7 @@
           <a:p>
             <a:fld id="{E69A4D3A-6EF8-7448-AC6F-AD52FEDAA6A8}" type="datetimeFigureOut">
               <a:rPr lang="en-US" smtClean="0"/>
-              <a:t>8/5/22</a:t>
+              <a:t>8/15/22</a:t>
             </a:fld>
             <a:endParaRPr lang="en-US" dirty="0"/>
           </a:p>
@@ -3993,7 +3993,7 @@
           <a:p>
             <a:fld id="{E69A4D3A-6EF8-7448-AC6F-AD52FEDAA6A8}" type="datetimeFigureOut">
               <a:rPr lang="en-US" smtClean="0"/>
-              <a:t>8/5/22</a:t>
+              <a:t>8/15/22</a:t>
             </a:fld>
             <a:endParaRPr lang="en-US" dirty="0"/>
           </a:p>
@@ -4238,7 +4238,7 @@
           <a:p>
             <a:fld id="{E69A4D3A-6EF8-7448-AC6F-AD52FEDAA6A8}" type="datetimeFigureOut">
               <a:rPr lang="en-US" smtClean="0"/>
-              <a:t>8/5/22</a:t>
+              <a:t>8/15/22</a:t>
             </a:fld>
             <a:endParaRPr lang="en-US" dirty="0"/>
           </a:p>
@@ -4523,7 +4523,7 @@
           <a:p>
             <a:fld id="{E69A4D3A-6EF8-7448-AC6F-AD52FEDAA6A8}" type="datetimeFigureOut">
               <a:rPr lang="en-US" smtClean="0"/>
-              <a:t>8/5/22</a:t>
+              <a:t>8/15/22</a:t>
             </a:fld>
             <a:endParaRPr lang="en-US" dirty="0"/>
           </a:p>
@@ -4942,7 +4942,7 @@
           <a:p>
             <a:fld id="{E69A4D3A-6EF8-7448-AC6F-AD52FEDAA6A8}" type="datetimeFigureOut">
               <a:rPr lang="en-US" smtClean="0"/>
-              <a:t>8/5/22</a:t>
+              <a:t>8/15/22</a:t>
             </a:fld>
             <a:endParaRPr lang="en-US" dirty="0"/>
           </a:p>
@@ -5059,7 +5059,7 @@
           <a:p>
             <a:fld id="{E69A4D3A-6EF8-7448-AC6F-AD52FEDAA6A8}" type="datetimeFigureOut">
               <a:rPr lang="en-US" smtClean="0"/>
-              <a:t>8/5/22</a:t>
+              <a:t>8/15/22</a:t>
             </a:fld>
             <a:endParaRPr lang="en-US" dirty="0"/>
           </a:p>
@@ -5154,7 +5154,7 @@
           <a:p>
             <a:fld id="{E69A4D3A-6EF8-7448-AC6F-AD52FEDAA6A8}" type="datetimeFigureOut">
               <a:rPr lang="en-US" smtClean="0"/>
-              <a:t>8/5/22</a:t>
+              <a:t>8/15/22</a:t>
             </a:fld>
             <a:endParaRPr lang="en-US" dirty="0"/>
           </a:p>
@@ -5429,7 +5429,7 @@
           <a:p>
             <a:fld id="{E69A4D3A-6EF8-7448-AC6F-AD52FEDAA6A8}" type="datetimeFigureOut">
               <a:rPr lang="en-US" smtClean="0"/>
-              <a:t>8/5/22</a:t>
+              <a:t>8/15/22</a:t>
             </a:fld>
             <a:endParaRPr lang="en-US" dirty="0"/>
           </a:p>
@@ -5684,7 +5684,7 @@
           <a:p>
             <a:fld id="{E69A4D3A-6EF8-7448-AC6F-AD52FEDAA6A8}" type="datetimeFigureOut">
               <a:rPr lang="en-US" smtClean="0"/>
-              <a:t>8/5/22</a:t>
+              <a:t>8/15/22</a:t>
             </a:fld>
             <a:endParaRPr lang="en-US" dirty="0"/>
           </a:p>
@@ -5898,7 +5898,7 @@
           <a:p>
             <a:fld id="{E69A4D3A-6EF8-7448-AC6F-AD52FEDAA6A8}" type="datetimeFigureOut">
               <a:rPr lang="en-US" smtClean="0"/>
-              <a:t>8/5/22</a:t>
+              <a:t>8/15/22</a:t>
             </a:fld>
             <a:endParaRPr lang="en-US" dirty="0"/>
           </a:p>
@@ -14709,87 +14709,6 @@
       </p:sp>
       <p:sp>
         <p:nvSpPr>
-          <p:cNvPr id="10" name="Rectangle 9">
-            <a:extLst>
-              <a:ext uri="{FF2B5EF4-FFF2-40B4-BE49-F238E27FC236}">
-                <a16:creationId xmlns:a16="http://schemas.microsoft.com/office/drawing/2014/main" id="{46174B80-EE29-A944-BB67-BD936DA33AE3}"/>
-              </a:ext>
-            </a:extLst>
-          </p:cNvPr>
-          <p:cNvSpPr/>
-          <p:nvPr/>
-        </p:nvSpPr>
-        <p:spPr>
-          <a:xfrm>
-            <a:off x="7037225" y="2995345"/>
-            <a:ext cx="4206240" cy="973959"/>
-          </a:xfrm>
-          <a:prstGeom prst="rect">
-            <a:avLst/>
-          </a:prstGeom>
-          <a:solidFill>
-            <a:schemeClr val="bg1"/>
-          </a:solidFill>
-          <a:ln>
-            <a:noFill/>
-          </a:ln>
-        </p:spPr>
-        <p:style>
-          <a:lnRef idx="2">
-            <a:schemeClr val="accent1">
-              <a:shade val="50000"/>
-            </a:schemeClr>
-          </a:lnRef>
-          <a:fillRef idx="1">
-            <a:schemeClr val="accent1"/>
-          </a:fillRef>
-          <a:effectRef idx="0">
-            <a:schemeClr val="accent1"/>
-          </a:effectRef>
-          <a:fontRef idx="minor">
-            <a:schemeClr val="lt1"/>
-          </a:fontRef>
-        </p:style>
-        <p:txBody>
-          <a:bodyPr rtlCol="0" anchor="ctr"/>
-          <a:lstStyle/>
-          <a:p>
-            <a:pPr marL="0" marR="0" lvl="0" indent="0" algn="ctr" defTabSz="457200" rtl="0" eaLnBrk="1" fontAlgn="auto" latinLnBrk="0" hangingPunct="1">
-              <a:lnSpc>
-                <a:spcPct val="100000"/>
-              </a:lnSpc>
-              <a:spcBef>
-                <a:spcPts val="0"/>
-              </a:spcBef>
-              <a:spcAft>
-                <a:spcPts val="0"/>
-              </a:spcAft>
-              <a:buClrTx/>
-              <a:buSzTx/>
-              <a:buFontTx/>
-              <a:buNone/>
-              <a:tabLst/>
-              <a:defRPr/>
-            </a:pPr>
-            <a:endParaRPr kumimoji="0" lang="en-US" sz="1800" b="0" i="0" u="none" strike="noStrike" kern="1200" cap="none" spc="0" normalizeH="0" baseline="0" noProof="0">
-              <a:ln>
-                <a:noFill/>
-              </a:ln>
-              <a:solidFill>
-                <a:prstClr val="white"/>
-              </a:solidFill>
-              <a:effectLst/>
-              <a:uLnTx/>
-              <a:uFillTx/>
-              <a:latin typeface="Calibri"/>
-              <a:ea typeface="+mn-ea"/>
-              <a:cs typeface="+mn-cs"/>
-            </a:endParaRPr>
-          </a:p>
-        </p:txBody>
-      </p:sp>
-      <p:sp>
-        <p:nvSpPr>
           <p:cNvPr id="11" name="TextBox 10">
             <a:extLst>
               <a:ext uri="{FF2B5EF4-FFF2-40B4-BE49-F238E27FC236}">
@@ -14802,8 +14721,8 @@
         </p:nvSpPr>
         <p:spPr>
           <a:xfrm>
-            <a:off x="3463326" y="3210291"/>
-            <a:ext cx="5265347" cy="923330"/>
+            <a:off x="3237733" y="3197714"/>
+            <a:ext cx="5716532" cy="923330"/>
           </a:xfrm>
           <a:prstGeom prst="rect">
             <a:avLst/>
@@ -14850,7 +14769,7 @@
                 <a:ea typeface="+mn-ea"/>
                 <a:cs typeface="+mn-cs"/>
               </a:rPr>
-              <a:t>YOU HAVE A DATE</a:t>
+              <a:t>YOU HAVE A DATE!</a:t>
             </a:r>
           </a:p>
         </p:txBody>

</xml_diff>